<commit_message>
Fix last image in transfer sample
Signed-off-by: NIKHIL E GUPTA <negupta@us.ibm.com>
</commit_message>
<xml_diff>
--- a/chaincode/marbles_transfer/images/transfer_marbles_images.pptx
+++ b/chaincode/marbles_transfer/images/transfer_marbles_images.pptx
@@ -261,7 +261,7 @@
           <a:p>
             <a:fld id="{C7085146-0BF9-7E45-AACD-59CE42CB07C4}" type="datetimeFigureOut">
               <a:rPr lang="en-US" smtClean="0"/>
-              <a:t>5/20/20</a:t>
+              <a:t>5/21/20</a:t>
             </a:fld>
             <a:endParaRPr lang="en-US"/>
           </a:p>
@@ -459,7 +459,7 @@
           <a:p>
             <a:fld id="{C7085146-0BF9-7E45-AACD-59CE42CB07C4}" type="datetimeFigureOut">
               <a:rPr lang="en-US" smtClean="0"/>
-              <a:t>5/20/20</a:t>
+              <a:t>5/21/20</a:t>
             </a:fld>
             <a:endParaRPr lang="en-US"/>
           </a:p>
@@ -667,7 +667,7 @@
           <a:p>
             <a:fld id="{C7085146-0BF9-7E45-AACD-59CE42CB07C4}" type="datetimeFigureOut">
               <a:rPr lang="en-US" smtClean="0"/>
-              <a:t>5/20/20</a:t>
+              <a:t>5/21/20</a:t>
             </a:fld>
             <a:endParaRPr lang="en-US"/>
           </a:p>
@@ -865,7 +865,7 @@
           <a:p>
             <a:fld id="{C7085146-0BF9-7E45-AACD-59CE42CB07C4}" type="datetimeFigureOut">
               <a:rPr lang="en-US" smtClean="0"/>
-              <a:t>5/20/20</a:t>
+              <a:t>5/21/20</a:t>
             </a:fld>
             <a:endParaRPr lang="en-US"/>
           </a:p>
@@ -1140,7 +1140,7 @@
           <a:p>
             <a:fld id="{C7085146-0BF9-7E45-AACD-59CE42CB07C4}" type="datetimeFigureOut">
               <a:rPr lang="en-US" smtClean="0"/>
-              <a:t>5/20/20</a:t>
+              <a:t>5/21/20</a:t>
             </a:fld>
             <a:endParaRPr lang="en-US"/>
           </a:p>
@@ -1405,7 +1405,7 @@
           <a:p>
             <a:fld id="{C7085146-0BF9-7E45-AACD-59CE42CB07C4}" type="datetimeFigureOut">
               <a:rPr lang="en-US" smtClean="0"/>
-              <a:t>5/20/20</a:t>
+              <a:t>5/21/20</a:t>
             </a:fld>
             <a:endParaRPr lang="en-US"/>
           </a:p>
@@ -1817,7 +1817,7 @@
           <a:p>
             <a:fld id="{C7085146-0BF9-7E45-AACD-59CE42CB07C4}" type="datetimeFigureOut">
               <a:rPr lang="en-US" smtClean="0"/>
-              <a:t>5/20/20</a:t>
+              <a:t>5/21/20</a:t>
             </a:fld>
             <a:endParaRPr lang="en-US"/>
           </a:p>
@@ -1958,7 +1958,7 @@
           <a:p>
             <a:fld id="{C7085146-0BF9-7E45-AACD-59CE42CB07C4}" type="datetimeFigureOut">
               <a:rPr lang="en-US" smtClean="0"/>
-              <a:t>5/20/20</a:t>
+              <a:t>5/21/20</a:t>
             </a:fld>
             <a:endParaRPr lang="en-US"/>
           </a:p>
@@ -2071,7 +2071,7 @@
           <a:p>
             <a:fld id="{C7085146-0BF9-7E45-AACD-59CE42CB07C4}" type="datetimeFigureOut">
               <a:rPr lang="en-US" smtClean="0"/>
-              <a:t>5/20/20</a:t>
+              <a:t>5/21/20</a:t>
             </a:fld>
             <a:endParaRPr lang="en-US"/>
           </a:p>
@@ -2382,7 +2382,7 @@
           <a:p>
             <a:fld id="{C7085146-0BF9-7E45-AACD-59CE42CB07C4}" type="datetimeFigureOut">
               <a:rPr lang="en-US" smtClean="0"/>
-              <a:t>5/20/20</a:t>
+              <a:t>5/21/20</a:t>
             </a:fld>
             <a:endParaRPr lang="en-US"/>
           </a:p>
@@ -2670,7 +2670,7 @@
           <a:p>
             <a:fld id="{C7085146-0BF9-7E45-AACD-59CE42CB07C4}" type="datetimeFigureOut">
               <a:rPr lang="en-US" smtClean="0"/>
-              <a:t>5/20/20</a:t>
+              <a:t>5/21/20</a:t>
             </a:fld>
             <a:endParaRPr lang="en-US"/>
           </a:p>
@@ -2911,7 +2911,7 @@
           <a:p>
             <a:fld id="{C7085146-0BF9-7E45-AACD-59CE42CB07C4}" type="datetimeFigureOut">
               <a:rPr lang="en-US" smtClean="0"/>
-              <a:t>5/20/20</a:t>
+              <a:t>5/21/20</a:t>
             </a:fld>
             <a:endParaRPr lang="en-US"/>
           </a:p>
@@ -6815,7 +6815,7 @@
                   <a:prstClr val="black"/>
                 </a:solidFill>
               </a:rPr>
-              <a:t>hash(110)</a:t>
+              <a:t>hash(100)</a:t>
             </a:r>
           </a:p>
           <a:p>
@@ -7447,7 +7447,7 @@
                   <a:prstClr val="black"/>
                 </a:solidFill>
               </a:rPr>
-              <a:t> 110</a:t>
+              <a:t> 100</a:t>
             </a:r>
           </a:p>
           <a:p>
@@ -7798,7 +7798,7 @@
                   <a:prstClr val="black"/>
                 </a:solidFill>
               </a:rPr>
-              <a:t>hash(110)</a:t>
+              <a:t>hash(100)</a:t>
             </a:r>
           </a:p>
           <a:p>

</xml_diff>